<commit_message>
update slide & demo
</commit_message>
<xml_diff>
--- a/slide/Using Ecto (without db) for validating form in Phoenix.pptx
+++ b/slide/Using Ecto (without db) for validating form in Phoenix.pptx
@@ -9545,7 +9545,7 @@
             </a:pPr>
             <a:r>
               <a:rPr lang="en"/>
-              <a:t>Easy restore state of form (cases: LiveView is crashed, user reload page).</a:t>
+              <a:t>Easy restore state of form (cases: LiveView is crashed, user reload page/go to other device).</a:t>
             </a:r>
             <a:endParaRPr/>
           </a:p>
@@ -9562,7 +9562,7 @@
             </a:pPr>
             <a:r>
               <a:rPr lang="en"/>
-              <a:t>Suggesting/auto completely directly in form.</a:t>
+              <a:t>Suggesting/auto complete directly in form.</a:t>
             </a:r>
             <a:endParaRPr/>
           </a:p>

</xml_diff>